<commit_message>
final changes to system
</commit_message>
<xml_diff>
--- a/Group 13.pptx
+++ b/Group 13.pptx
@@ -10,6 +10,8 @@
     <p:sldId id="258" r:id="rId4"/>
     <p:sldId id="259" r:id="rId5"/>
     <p:sldId id="260" r:id="rId6"/>
+    <p:sldId id="261" r:id="rId7"/>
+    <p:sldId id="262" r:id="rId8"/>
   </p:sldIdLst>
   <p:sldSz cx="12192000" cy="6858000"/>
   <p:notesSz cx="6858000" cy="9144000"/>
@@ -390,7 +392,7 @@
           <a:p>
             <a:fld id="{78ABE3C1-DBE1-495D-B57B-2849774B866A}" type="datetimeFigureOut">
               <a:rPr lang="en-US" smtClean="0"/>
-              <a:t>9/8/2019</a:t>
+              <a:t>10/10/2019</a:t>
             </a:fld>
             <a:endParaRPr lang="en-US" dirty="0"/>
           </a:p>
@@ -804,7 +806,7 @@
           <a:p>
             <a:fld id="{446C117F-5CCF-4837-BE5F-2B92066CAFAF}" type="datetimeFigureOut">
               <a:rPr lang="en-US" smtClean="0"/>
-              <a:t>9/8/2019</a:t>
+              <a:t>10/10/2019</a:t>
             </a:fld>
             <a:endParaRPr lang="en-US" dirty="0"/>
           </a:p>
@@ -1140,7 +1142,7 @@
           <a:p>
             <a:fld id="{84EB90BD-B6CE-46B7-997F-7313B992CCDC}" type="datetimeFigureOut">
               <a:rPr lang="en-US" smtClean="0"/>
-              <a:t>9/8/2019</a:t>
+              <a:t>10/10/2019</a:t>
             </a:fld>
             <a:endParaRPr lang="en-US" dirty="0"/>
           </a:p>
@@ -1545,7 +1547,7 @@
           <a:p>
             <a:fld id="{CDB9D11F-B188-461D-B23F-39381795C052}" type="datetimeFigureOut">
               <a:rPr lang="en-US" smtClean="0"/>
-              <a:t>9/8/2019</a:t>
+              <a:t>10/10/2019</a:t>
             </a:fld>
             <a:endParaRPr lang="en-US" dirty="0"/>
           </a:p>
@@ -2113,7 +2115,7 @@
           <a:p>
             <a:fld id="{52E6D8D9-55A2-4063-B0F3-121F44549695}" type="datetimeFigureOut">
               <a:rPr lang="en-US" smtClean="0"/>
-              <a:t>9/8/2019</a:t>
+              <a:t>10/10/2019</a:t>
             </a:fld>
             <a:endParaRPr lang="en-US" dirty="0"/>
           </a:p>
@@ -2794,7 +2796,7 @@
           <a:p>
             <a:fld id="{D4B24536-994D-4021-A283-9F449C0DB509}" type="datetimeFigureOut">
               <a:rPr lang="en-US" smtClean="0"/>
-              <a:t>9/8/2019</a:t>
+              <a:t>10/10/2019</a:t>
             </a:fld>
             <a:endParaRPr lang="en-US" dirty="0"/>
           </a:p>
@@ -3707,7 +3709,7 @@
           <a:p>
             <a:fld id="{3CBBBB78-C96F-47B7-AB17-D852CA960AC9}" type="datetimeFigureOut">
               <a:rPr lang="en-US" smtClean="0"/>
-              <a:t>9/8/2019</a:t>
+              <a:t>10/10/2019</a:t>
             </a:fld>
             <a:endParaRPr lang="en-US" dirty="0"/>
           </a:p>
@@ -4020,7 +4022,7 @@
           <a:p>
             <a:fld id="{1FA3F48C-C7C6-4055-9F49-3777875E72AE}" type="datetimeFigureOut">
               <a:rPr lang="en-US" smtClean="0"/>
-              <a:t>9/8/2019</a:t>
+              <a:t>10/10/2019</a:t>
             </a:fld>
             <a:endParaRPr lang="en-US" dirty="0"/>
           </a:p>
@@ -4284,7 +4286,7 @@
           <a:p>
             <a:fld id="{6178E61D-D431-422C-9764-11DAFE33AB63}" type="datetimeFigureOut">
               <a:rPr lang="en-US" smtClean="0"/>
-              <a:t>9/8/2019</a:t>
+              <a:t>10/10/2019</a:t>
             </a:fld>
             <a:endParaRPr lang="en-US" dirty="0"/>
           </a:p>
@@ -4608,7 +4610,7 @@
           <a:p>
             <a:fld id="{12DE42F4-6EEF-4EF7-8ED4-2208F0F89A08}" type="datetimeFigureOut">
               <a:rPr lang="en-US" smtClean="0"/>
-              <a:t>9/8/2019</a:t>
+              <a:t>10/10/2019</a:t>
             </a:fld>
             <a:endParaRPr lang="en-US" dirty="0"/>
           </a:p>
@@ -4997,7 +4999,7 @@
           <a:p>
             <a:fld id="{30578ACC-22D6-47C1-A373-4FD133E34F3C}" type="datetimeFigureOut">
               <a:rPr lang="en-US" smtClean="0"/>
-              <a:t>9/8/2019</a:t>
+              <a:t>10/10/2019</a:t>
             </a:fld>
             <a:endParaRPr lang="en-US" dirty="0"/>
           </a:p>
@@ -5373,7 +5375,7 @@
           <a:p>
             <a:fld id="{4E5A6C69-6797-4E8A-BF37-F2C3751466E9}" type="datetimeFigureOut">
               <a:rPr lang="en-US" smtClean="0"/>
-              <a:t>9/8/2019</a:t>
+              <a:t>10/10/2019</a:t>
             </a:fld>
             <a:endParaRPr lang="en-US" dirty="0"/>
           </a:p>
@@ -5879,7 +5881,7 @@
           <a:p>
             <a:fld id="{D82014A1-A632-4878-A0D3-F52BA7563730}" type="datetimeFigureOut">
               <a:rPr lang="en-US" smtClean="0"/>
-              <a:t>9/8/2019</a:t>
+              <a:t>10/10/2019</a:t>
             </a:fld>
             <a:endParaRPr lang="en-US" dirty="0"/>
           </a:p>
@@ -6136,7 +6138,7 @@
           <a:p>
             <a:fld id="{CE99F462-093F-4566-844B-4C71F2739DA5}" type="datetimeFigureOut">
               <a:rPr lang="en-US" smtClean="0"/>
-              <a:t>9/8/2019</a:t>
+              <a:t>10/10/2019</a:t>
             </a:fld>
             <a:endParaRPr lang="en-US" dirty="0"/>
           </a:p>
@@ -6299,7 +6301,7 @@
           <a:p>
             <a:fld id="{3D24A7AC-904D-4781-85BA-7D10C17ED021}" type="datetimeFigureOut">
               <a:rPr lang="en-US" smtClean="0"/>
-              <a:t>9/8/2019</a:t>
+              <a:t>10/10/2019</a:t>
             </a:fld>
             <a:endParaRPr lang="en-US" dirty="0"/>
           </a:p>
@@ -6689,7 +6691,7 @@
           <a:p>
             <a:fld id="{E331444B-B92B-4E27-8C94-BB93EAF5CB18}" type="datetimeFigureOut">
               <a:rPr lang="en-US" smtClean="0"/>
-              <a:t>9/8/2019</a:t>
+              <a:t>10/10/2019</a:t>
             </a:fld>
             <a:endParaRPr lang="en-US" dirty="0"/>
           </a:p>
@@ -7098,7 +7100,7 @@
           <a:p>
             <a:fld id="{363EFA5E-FA76-400D-B3DC-F0BA90E6D107}" type="datetimeFigureOut">
               <a:rPr lang="en-US" smtClean="0"/>
-              <a:t>9/8/2019</a:t>
+              <a:t>10/10/2019</a:t>
             </a:fld>
             <a:endParaRPr lang="en-US" dirty="0"/>
           </a:p>
@@ -7342,7 +7344,7 @@
           <a:p>
             <a:fld id="{9D6E9DEC-419B-4CC5-A080-3B06BD5A8291}" type="datetimeFigureOut">
               <a:rPr lang="en-US" smtClean="0"/>
-              <a:t>9/8/2019</a:t>
+              <a:t>10/10/2019</a:t>
             </a:fld>
             <a:endParaRPr lang="en-US" dirty="0"/>
           </a:p>
@@ -7835,7 +7837,7 @@
           <a:p>
             <a:r>
               <a:rPr lang="en-ZA" dirty="0"/>
-              <a:t>Ngomseu Herver Fotsing, Sean Nalwamondo</a:t>
+              <a:t>Ngomseu Herve Fotsing, Sean Nalwamondo</a:t>
             </a:r>
           </a:p>
         </p:txBody>
@@ -8051,7 +8053,12 @@
             <p:ph idx="1"/>
           </p:nvPr>
         </p:nvSpPr>
-        <p:spPr/>
+        <p:spPr>
+          <a:xfrm>
+            <a:off x="680321" y="2336873"/>
+            <a:ext cx="9613861" cy="3599316"/>
+          </a:xfrm>
+        </p:spPr>
         <p:txBody>
           <a:bodyPr/>
           <a:lstStyle/>
@@ -8074,14 +8081,26 @@
             </a:pPr>
             <a:r>
               <a:rPr lang="en-ZA" dirty="0"/>
-              <a:t>  During the warehouse management process many of the employees do not know what most of the goods look like, resulting in human errors.</a:t>
+              <a:t>Identification of products leading to human errors.</a:t>
             </a:r>
           </a:p>
           <a:p>
             <a:pPr marL="0" indent="0">
               <a:buNone/>
             </a:pPr>
-            <a:endParaRPr lang="en-ZA" dirty="0"/>
+            <a:r>
+              <a:rPr lang="en-ZA" dirty="0"/>
+              <a:t>2)  Jobs management for different employees.</a:t>
+            </a:r>
+          </a:p>
+          <a:p>
+            <a:pPr marL="0" indent="0">
+              <a:buNone/>
+            </a:pPr>
+            <a:r>
+              <a:rPr lang="en-ZA" dirty="0"/>
+              <a:t>3)  Goods are damaged and untracked.</a:t>
+            </a:r>
           </a:p>
         </p:txBody>
       </p:sp>
@@ -8293,6 +8312,183 @@
     <p:extLst>
       <p:ext uri="{BB962C8B-B14F-4D97-AF65-F5344CB8AC3E}">
         <p14:creationId xmlns:p14="http://schemas.microsoft.com/office/powerpoint/2010/main" val="1845268424"/>
+      </p:ext>
+    </p:extLst>
+  </p:cSld>
+  <p:clrMapOvr>
+    <a:masterClrMapping/>
+  </p:clrMapOvr>
+</p:sld>
+</file>
+
+<file path=ppt/slides/slide6.xml><?xml version="1.0" encoding="utf-8"?>
+<p:sld xmlns:a="http://schemas.openxmlformats.org/drawingml/2006/main" xmlns:r="http://schemas.openxmlformats.org/officeDocument/2006/relationships" xmlns:p="http://schemas.openxmlformats.org/presentationml/2006/main">
+  <p:cSld>
+    <p:spTree>
+      <p:nvGrpSpPr>
+        <p:cNvPr id="1" name=""/>
+        <p:cNvGrpSpPr/>
+        <p:nvPr/>
+      </p:nvGrpSpPr>
+      <p:grpSpPr>
+        <a:xfrm>
+          <a:off x="0" y="0"/>
+          <a:ext cx="0" cy="0"/>
+          <a:chOff x="0" y="0"/>
+          <a:chExt cx="0" cy="0"/>
+        </a:xfrm>
+      </p:grpSpPr>
+      <p:sp>
+        <p:nvSpPr>
+          <p:cNvPr id="2" name="Title 1">
+            <a:extLst>
+              <a:ext uri="{FF2B5EF4-FFF2-40B4-BE49-F238E27FC236}">
+                <a16:creationId xmlns:a16="http://schemas.microsoft.com/office/drawing/2014/main" id="{CD7C74AC-7226-4593-BC06-C7617B5434D6}"/>
+              </a:ext>
+            </a:extLst>
+          </p:cNvPr>
+          <p:cNvSpPr>
+            <a:spLocks noGrp="1"/>
+          </p:cNvSpPr>
+          <p:nvPr>
+            <p:ph type="title"/>
+          </p:nvPr>
+        </p:nvSpPr>
+        <p:spPr/>
+        <p:txBody>
+          <a:bodyPr/>
+          <a:lstStyle/>
+          <a:p>
+            <a:r>
+              <a:rPr lang="en-ZA" dirty="0"/>
+              <a:t>DEMO Time</a:t>
+            </a:r>
+          </a:p>
+        </p:txBody>
+      </p:sp>
+      <p:sp>
+        <p:nvSpPr>
+          <p:cNvPr id="3" name="Content Placeholder 2">
+            <a:extLst>
+              <a:ext uri="{FF2B5EF4-FFF2-40B4-BE49-F238E27FC236}">
+                <a16:creationId xmlns:a16="http://schemas.microsoft.com/office/drawing/2014/main" id="{476B1629-0439-4AE8-AB45-F3738C0843F3}"/>
+              </a:ext>
+            </a:extLst>
+          </p:cNvPr>
+          <p:cNvSpPr>
+            <a:spLocks noGrp="1"/>
+          </p:cNvSpPr>
+          <p:nvPr>
+            <p:ph idx="1"/>
+          </p:nvPr>
+        </p:nvSpPr>
+        <p:spPr/>
+        <p:txBody>
+          <a:bodyPr/>
+          <a:lstStyle/>
+          <a:p>
+            <a:pPr marL="457200" indent="-457200">
+              <a:buAutoNum type="arabicParenR" startAt="2"/>
+            </a:pPr>
+            <a:endParaRPr lang="en-ZA" dirty="0"/>
+          </a:p>
+        </p:txBody>
+      </p:sp>
+    </p:spTree>
+    <p:extLst>
+      <p:ext uri="{BB962C8B-B14F-4D97-AF65-F5344CB8AC3E}">
+        <p14:creationId xmlns:p14="http://schemas.microsoft.com/office/powerpoint/2010/main" val="1585166725"/>
+      </p:ext>
+    </p:extLst>
+  </p:cSld>
+  <p:clrMapOvr>
+    <a:masterClrMapping/>
+  </p:clrMapOvr>
+</p:sld>
+</file>
+
+<file path=ppt/slides/slide7.xml><?xml version="1.0" encoding="utf-8"?>
+<p:sld xmlns:a="http://schemas.openxmlformats.org/drawingml/2006/main" xmlns:r="http://schemas.openxmlformats.org/officeDocument/2006/relationships" xmlns:p="http://schemas.openxmlformats.org/presentationml/2006/main">
+  <p:cSld>
+    <p:spTree>
+      <p:nvGrpSpPr>
+        <p:cNvPr id="1" name=""/>
+        <p:cNvGrpSpPr/>
+        <p:nvPr/>
+      </p:nvGrpSpPr>
+      <p:grpSpPr>
+        <a:xfrm>
+          <a:off x="0" y="0"/>
+          <a:ext cx="0" cy="0"/>
+          <a:chOff x="0" y="0"/>
+          <a:chExt cx="0" cy="0"/>
+        </a:xfrm>
+      </p:grpSpPr>
+      <p:sp>
+        <p:nvSpPr>
+          <p:cNvPr id="2" name="Title 1">
+            <a:extLst>
+              <a:ext uri="{FF2B5EF4-FFF2-40B4-BE49-F238E27FC236}">
+                <a16:creationId xmlns:a16="http://schemas.microsoft.com/office/drawing/2014/main" id="{CD7C74AC-7226-4593-BC06-C7617B5434D6}"/>
+              </a:ext>
+            </a:extLst>
+          </p:cNvPr>
+          <p:cNvSpPr>
+            <a:spLocks noGrp="1"/>
+          </p:cNvSpPr>
+          <p:nvPr>
+            <p:ph type="title"/>
+          </p:nvPr>
+        </p:nvSpPr>
+        <p:spPr/>
+        <p:txBody>
+          <a:bodyPr/>
+          <a:lstStyle/>
+          <a:p>
+            <a:r>
+              <a:rPr lang="en-ZA" dirty="0"/>
+              <a:t>Thank you for your time</a:t>
+            </a:r>
+          </a:p>
+        </p:txBody>
+      </p:sp>
+      <p:sp>
+        <p:nvSpPr>
+          <p:cNvPr id="3" name="Content Placeholder 2">
+            <a:extLst>
+              <a:ext uri="{FF2B5EF4-FFF2-40B4-BE49-F238E27FC236}">
+                <a16:creationId xmlns:a16="http://schemas.microsoft.com/office/drawing/2014/main" id="{476B1629-0439-4AE8-AB45-F3738C0843F3}"/>
+              </a:ext>
+            </a:extLst>
+          </p:cNvPr>
+          <p:cNvSpPr>
+            <a:spLocks noGrp="1"/>
+          </p:cNvSpPr>
+          <p:nvPr>
+            <p:ph idx="1"/>
+          </p:nvPr>
+        </p:nvSpPr>
+        <p:spPr/>
+        <p:txBody>
+          <a:bodyPr>
+            <a:normAutofit/>
+          </a:bodyPr>
+          <a:lstStyle/>
+          <a:p>
+            <a:pPr marL="0" indent="0">
+              <a:buNone/>
+            </a:pPr>
+            <a:r>
+              <a:rPr lang="en-ZA" sz="6000" dirty="0"/>
+              <a:t>Question and Answer!!!</a:t>
+            </a:r>
+          </a:p>
+        </p:txBody>
+      </p:sp>
+    </p:spTree>
+    <p:extLst>
+      <p:ext uri="{BB962C8B-B14F-4D97-AF65-F5344CB8AC3E}">
+        <p14:creationId xmlns:p14="http://schemas.microsoft.com/office/powerpoint/2010/main" val="1562298041"/>
       </p:ext>
     </p:extLst>
   </p:cSld>

</xml_diff>